<commit_message>
code in c up to 47 in html 20 and sum notes.
</commit_message>
<xml_diff>
--- a/BCA/Computer Fundamentals and MS-Office (P)F1.pptx
+++ b/BCA/Computer Fundamentals and MS-Office (P)F1.pptx
@@ -261,7 +261,7 @@
           <a:p>
             <a:fld id="{49611CBD-5DE5-42AB-B1EB-E52F4A100369}" type="datetimeFigureOut">
               <a:rPr lang="en-IN" smtClean="0"/>
-              <a:t>04-08-2024</a:t>
+              <a:t>20-10-2024</a:t>
             </a:fld>
             <a:endParaRPr lang="en-IN"/>
           </a:p>
@@ -461,7 +461,7 @@
           <a:p>
             <a:fld id="{49611CBD-5DE5-42AB-B1EB-E52F4A100369}" type="datetimeFigureOut">
               <a:rPr lang="en-IN" smtClean="0"/>
-              <a:t>04-08-2024</a:t>
+              <a:t>20-10-2024</a:t>
             </a:fld>
             <a:endParaRPr lang="en-IN"/>
           </a:p>
@@ -671,7 +671,7 @@
           <a:p>
             <a:fld id="{49611CBD-5DE5-42AB-B1EB-E52F4A100369}" type="datetimeFigureOut">
               <a:rPr lang="en-IN" smtClean="0"/>
-              <a:t>04-08-2024</a:t>
+              <a:t>20-10-2024</a:t>
             </a:fld>
             <a:endParaRPr lang="en-IN"/>
           </a:p>
@@ -871,7 +871,7 @@
           <a:p>
             <a:fld id="{49611CBD-5DE5-42AB-B1EB-E52F4A100369}" type="datetimeFigureOut">
               <a:rPr lang="en-IN" smtClean="0"/>
-              <a:t>04-08-2024</a:t>
+              <a:t>20-10-2024</a:t>
             </a:fld>
             <a:endParaRPr lang="en-IN"/>
           </a:p>
@@ -1147,7 +1147,7 @@
           <a:p>
             <a:fld id="{49611CBD-5DE5-42AB-B1EB-E52F4A100369}" type="datetimeFigureOut">
               <a:rPr lang="en-IN" smtClean="0"/>
-              <a:t>04-08-2024</a:t>
+              <a:t>20-10-2024</a:t>
             </a:fld>
             <a:endParaRPr lang="en-IN"/>
           </a:p>
@@ -1415,7 +1415,7 @@
           <a:p>
             <a:fld id="{49611CBD-5DE5-42AB-B1EB-E52F4A100369}" type="datetimeFigureOut">
               <a:rPr lang="en-IN" smtClean="0"/>
-              <a:t>04-08-2024</a:t>
+              <a:t>20-10-2024</a:t>
             </a:fld>
             <a:endParaRPr lang="en-IN"/>
           </a:p>
@@ -1830,7 +1830,7 @@
           <a:p>
             <a:fld id="{49611CBD-5DE5-42AB-B1EB-E52F4A100369}" type="datetimeFigureOut">
               <a:rPr lang="en-IN" smtClean="0"/>
-              <a:t>04-08-2024</a:t>
+              <a:t>20-10-2024</a:t>
             </a:fld>
             <a:endParaRPr lang="en-IN"/>
           </a:p>
@@ -1972,7 +1972,7 @@
           <a:p>
             <a:fld id="{49611CBD-5DE5-42AB-B1EB-E52F4A100369}" type="datetimeFigureOut">
               <a:rPr lang="en-IN" smtClean="0"/>
-              <a:t>04-08-2024</a:t>
+              <a:t>20-10-2024</a:t>
             </a:fld>
             <a:endParaRPr lang="en-IN"/>
           </a:p>
@@ -2085,7 +2085,7 @@
           <a:p>
             <a:fld id="{49611CBD-5DE5-42AB-B1EB-E52F4A100369}" type="datetimeFigureOut">
               <a:rPr lang="en-IN" smtClean="0"/>
-              <a:t>04-08-2024</a:t>
+              <a:t>20-10-2024</a:t>
             </a:fld>
             <a:endParaRPr lang="en-IN"/>
           </a:p>
@@ -2398,7 +2398,7 @@
           <a:p>
             <a:fld id="{49611CBD-5DE5-42AB-B1EB-E52F4A100369}" type="datetimeFigureOut">
               <a:rPr lang="en-IN" smtClean="0"/>
-              <a:t>04-08-2024</a:t>
+              <a:t>20-10-2024</a:t>
             </a:fld>
             <a:endParaRPr lang="en-IN"/>
           </a:p>
@@ -2687,7 +2687,7 @@
           <a:p>
             <a:fld id="{49611CBD-5DE5-42AB-B1EB-E52F4A100369}" type="datetimeFigureOut">
               <a:rPr lang="en-IN" smtClean="0"/>
-              <a:t>04-08-2024</a:t>
+              <a:t>20-10-2024</a:t>
             </a:fld>
             <a:endParaRPr lang="en-IN"/>
           </a:p>
@@ -2930,7 +2930,7 @@
           <a:p>
             <a:fld id="{49611CBD-5DE5-42AB-B1EB-E52F4A100369}" type="datetimeFigureOut">
               <a:rPr lang="en-IN" smtClean="0"/>
-              <a:t>04-08-2024</a:t>
+              <a:t>20-10-2024</a:t>
             </a:fld>
             <a:endParaRPr lang="en-IN"/>
           </a:p>
@@ -3436,16 +3436,6 @@
               <a:t>UNIT-1</a:t>
             </a:r>
           </a:p>
-          <a:p>
-            <a:pPr algn="ctr"/>
-            <a:r>
-              <a:rPr lang="en-IN" dirty="0">
-                <a:hlinkClick r:id="rId2" action="ppaction://hlinkpres?slideindex=1&amp;slidetitle="/>
-              </a:rPr>
-              <a:t>Introduction to Computers</a:t>
-            </a:r>
-            <a:endParaRPr lang="en-IN" dirty="0"/>
-          </a:p>
         </p:txBody>
       </p:sp>
       <p:sp>

</xml_diff>